<commit_message>
update ppt with code snippets
</commit_message>
<xml_diff>
--- a/MIPS2.pptx
+++ b/MIPS2.pptx
@@ -8,8 +8,11 @@
     <p:sldId id="256" r:id="rId2"/>
     <p:sldId id="257" r:id="rId3"/>
     <p:sldId id="258" r:id="rId4"/>
-    <p:sldId id="259" r:id="rId5"/>
-    <p:sldId id="260" r:id="rId6"/>
+    <p:sldId id="261" r:id="rId5"/>
+    <p:sldId id="262" r:id="rId6"/>
+    <p:sldId id="263" r:id="rId7"/>
+    <p:sldId id="259" r:id="rId8"/>
+    <p:sldId id="260" r:id="rId9"/>
   </p:sldIdLst>
   <p:sldSz cx="12192000" cy="6858000"/>
   <p:notesSz cx="6858000" cy="9144000"/>
@@ -108,6 +111,11 @@
       </a:defRPr>
     </a:lvl9pPr>
   </p:defaultTextStyle>
+  <p:extLst>
+    <p:ext uri="{EFAFB233-063F-42B5-8137-9DF3F51BA10A}">
+      <p15:sldGuideLst xmlns:p15="http://schemas.microsoft.com/office/powerpoint/2012/main"/>
+    </p:ext>
+  </p:extLst>
 </p:presentation>
 </file>
 
@@ -3799,12 +3807,8 @@
           </a:p>
           <a:p>
             <a:r>
-              <a:rPr lang="en-US" dirty="0"/>
-              <a:t>a</a:t>
-            </a:r>
-            <a:r>
               <a:rPr lang="en-US" dirty="0" smtClean="0"/>
-              <a:t>dd</a:t>
+              <a:t>add </a:t>
             </a:r>
             <a:endParaRPr lang="en-US" dirty="0"/>
           </a:p>
@@ -3822,8 +3826,8 @@
               <a:t> = add </a:t>
             </a:r>
             <a:r>
-              <a:rPr lang="en-US" dirty="0" err="1" smtClean="0"/>
-              <a:t>imm</a:t>
+              <a:rPr lang="en-US" dirty="0" smtClean="0"/>
+              <a:t>immediate</a:t>
             </a:r>
             <a:endParaRPr lang="en-US" dirty="0" smtClean="0"/>
           </a:p>
@@ -3838,8 +3842,45 @@
             </a:r>
             <a:r>
               <a:rPr lang="en-US" dirty="0" smtClean="0"/>
-              <a:t> =branch less than</a:t>
-            </a:r>
+              <a:t> </a:t>
+            </a:r>
+            <a:r>
+              <a:rPr lang="en-US" dirty="0" smtClean="0"/>
+              <a:t>= branch </a:t>
+            </a:r>
+            <a:r>
+              <a:rPr lang="en-US" dirty="0" smtClean="0"/>
+              <a:t>less </a:t>
+            </a:r>
+            <a:r>
+              <a:rPr lang="en-US" dirty="0" smtClean="0"/>
+              <a:t>than (</a:t>
+            </a:r>
+            <a:r>
+              <a:rPr lang="en-US" dirty="0" err="1" smtClean="0"/>
+              <a:t>pseudoinstruction</a:t>
+            </a:r>
+            <a:r>
+              <a:rPr lang="en-US" dirty="0" smtClean="0"/>
+              <a:t> for </a:t>
+            </a:r>
+            <a:r>
+              <a:rPr lang="en-US" dirty="0" err="1" smtClean="0"/>
+              <a:t>slt</a:t>
+            </a:r>
+            <a:r>
+              <a:rPr lang="en-US" dirty="0" smtClean="0"/>
+              <a:t> and </a:t>
+            </a:r>
+            <a:r>
+              <a:rPr lang="en-US" dirty="0" err="1" smtClean="0"/>
+              <a:t>beq</a:t>
+            </a:r>
+            <a:r>
+              <a:rPr lang="en-US" dirty="0" smtClean="0"/>
+              <a:t>)</a:t>
+            </a:r>
+            <a:endParaRPr lang="en-US" dirty="0" smtClean="0"/>
           </a:p>
           <a:p>
             <a:r>
@@ -3925,25 +3966,30 @@
           </a:p>
         </p:txBody>
       </p:sp>
-      <p:sp>
-        <p:nvSpPr>
-          <p:cNvPr id="7" name="Content Placeholder 6"/>
-          <p:cNvSpPr>
-            <a:spLocks noGrp="1"/>
-          </p:cNvSpPr>
-          <p:nvPr>
-            <p:ph idx="1"/>
-          </p:nvPr>
-        </p:nvSpPr>
-        <p:spPr/>
-        <p:txBody>
-          <a:bodyPr/>
-          <a:lstStyle/>
-          <a:p>
-            <a:endParaRPr lang="en-US"/>
-          </a:p>
-        </p:txBody>
-      </p:sp>
+      <p:pic>
+        <p:nvPicPr>
+          <p:cNvPr id="5" name="Picture 4"/>
+          <p:cNvPicPr>
+            <a:picLocks noChangeAspect="1"/>
+          </p:cNvPicPr>
+          <p:nvPr/>
+        </p:nvPicPr>
+        <p:blipFill>
+          <a:blip r:embed="rId2"/>
+          <a:stretch>
+            <a:fillRect/>
+          </a:stretch>
+        </p:blipFill>
+        <p:spPr>
+          <a:xfrm>
+            <a:off x="942975" y="1804988"/>
+            <a:ext cx="10306050" cy="3248025"/>
+          </a:xfrm>
+          <a:prstGeom prst="rect">
+            <a:avLst/>
+          </a:prstGeom>
+        </p:spPr>
+      </p:pic>
     </p:spTree>
     <p:extLst>
       <p:ext uri="{BB962C8B-B14F-4D97-AF65-F5344CB8AC3E}">
@@ -3984,28 +4030,53 @@
             <p:ph type="title"/>
           </p:nvPr>
         </p:nvSpPr>
-        <p:spPr>
-          <a:xfrm>
-            <a:off x="2347515" y="2668801"/>
-            <a:ext cx="7729728" cy="1188720"/>
-          </a:xfrm>
-        </p:spPr>
-        <p:txBody>
-          <a:bodyPr/>
-          <a:lstStyle/>
-          <a:p>
+        <p:spPr/>
+        <p:txBody>
+          <a:bodyPr>
+            <a:normAutofit/>
+          </a:bodyPr>
+          <a:lstStyle/>
+          <a:p>
+            <a:r>
+              <a:rPr lang="en-US" dirty="0"/>
+              <a:t>A</a:t>
+            </a:r>
             <a:r>
               <a:rPr lang="en-US" dirty="0" smtClean="0"/>
-              <a:t>Demo</a:t>
+              <a:t>ssembly language listing of your program</a:t>
             </a:r>
             <a:endParaRPr lang="en-US" dirty="0"/>
           </a:p>
         </p:txBody>
       </p:sp>
+      <p:pic>
+        <p:nvPicPr>
+          <p:cNvPr id="8" name="Picture 7"/>
+          <p:cNvPicPr>
+            <a:picLocks noChangeAspect="1"/>
+          </p:cNvPicPr>
+          <p:nvPr/>
+        </p:nvPicPr>
+        <p:blipFill>
+          <a:blip r:embed="rId2"/>
+          <a:stretch>
+            <a:fillRect/>
+          </a:stretch>
+        </p:blipFill>
+        <p:spPr>
+          <a:xfrm>
+            <a:off x="47968" y="877077"/>
+            <a:ext cx="12096064" cy="5304647"/>
+          </a:xfrm>
+          <a:prstGeom prst="rect">
+            <a:avLst/>
+          </a:prstGeom>
+        </p:spPr>
+      </p:pic>
     </p:spTree>
     <p:extLst>
       <p:ext uri="{BB962C8B-B14F-4D97-AF65-F5344CB8AC3E}">
-        <p14:creationId xmlns:p14="http://schemas.microsoft.com/office/powerpoint/2010/main" val="2557638148"/>
+        <p14:creationId xmlns:p14="http://schemas.microsoft.com/office/powerpoint/2010/main" val="3672841847"/>
       </p:ext>
     </p:extLst>
   </p:cSld>
@@ -4032,6 +4103,172 @@
           <a:chExt cx="0" cy="0"/>
         </a:xfrm>
       </p:grpSpPr>
+      <p:pic>
+        <p:nvPicPr>
+          <p:cNvPr id="4" name="Picture 3"/>
+          <p:cNvPicPr>
+            <a:picLocks noChangeAspect="1"/>
+          </p:cNvPicPr>
+          <p:nvPr/>
+        </p:nvPicPr>
+        <p:blipFill>
+          <a:blip r:embed="rId2"/>
+          <a:stretch>
+            <a:fillRect/>
+          </a:stretch>
+        </p:blipFill>
+        <p:spPr>
+          <a:xfrm>
+            <a:off x="176212" y="1704975"/>
+            <a:ext cx="11839575" cy="3448050"/>
+          </a:xfrm>
+          <a:prstGeom prst="rect">
+            <a:avLst/>
+          </a:prstGeom>
+        </p:spPr>
+      </p:pic>
+    </p:spTree>
+    <p:extLst>
+      <p:ext uri="{BB962C8B-B14F-4D97-AF65-F5344CB8AC3E}">
+        <p14:creationId xmlns:p14="http://schemas.microsoft.com/office/powerpoint/2010/main" val="2169575448"/>
+      </p:ext>
+    </p:extLst>
+  </p:cSld>
+  <p:clrMapOvr>
+    <a:masterClrMapping/>
+  </p:clrMapOvr>
+</p:sld>
+</file>
+
+<file path=ppt/slides/slide6.xml><?xml version="1.0" encoding="utf-8"?>
+<p:sld xmlns:a="http://schemas.openxmlformats.org/drawingml/2006/main" xmlns:r="http://schemas.openxmlformats.org/officeDocument/2006/relationships" xmlns:p="http://schemas.openxmlformats.org/presentationml/2006/main">
+  <p:cSld>
+    <p:spTree>
+      <p:nvGrpSpPr>
+        <p:cNvPr id="1" name=""/>
+        <p:cNvGrpSpPr/>
+        <p:nvPr/>
+      </p:nvGrpSpPr>
+      <p:grpSpPr>
+        <a:xfrm>
+          <a:off x="0" y="0"/>
+          <a:ext cx="0" cy="0"/>
+          <a:chOff x="0" y="0"/>
+          <a:chExt cx="0" cy="0"/>
+        </a:xfrm>
+      </p:grpSpPr>
+      <p:pic>
+        <p:nvPicPr>
+          <p:cNvPr id="3" name="Picture 2"/>
+          <p:cNvPicPr>
+            <a:picLocks noChangeAspect="1"/>
+          </p:cNvPicPr>
+          <p:nvPr/>
+        </p:nvPicPr>
+        <p:blipFill>
+          <a:blip r:embed="rId2"/>
+          <a:stretch>
+            <a:fillRect/>
+          </a:stretch>
+        </p:blipFill>
+        <p:spPr>
+          <a:xfrm>
+            <a:off x="1209675" y="1766887"/>
+            <a:ext cx="9772650" cy="3324225"/>
+          </a:xfrm>
+          <a:prstGeom prst="rect">
+            <a:avLst/>
+          </a:prstGeom>
+        </p:spPr>
+      </p:pic>
+    </p:spTree>
+    <p:extLst>
+      <p:ext uri="{BB962C8B-B14F-4D97-AF65-F5344CB8AC3E}">
+        <p14:creationId xmlns:p14="http://schemas.microsoft.com/office/powerpoint/2010/main" val="3641313190"/>
+      </p:ext>
+    </p:extLst>
+  </p:cSld>
+  <p:clrMapOvr>
+    <a:masterClrMapping/>
+  </p:clrMapOvr>
+</p:sld>
+</file>
+
+<file path=ppt/slides/slide7.xml><?xml version="1.0" encoding="utf-8"?>
+<p:sld xmlns:a="http://schemas.openxmlformats.org/drawingml/2006/main" xmlns:r="http://schemas.openxmlformats.org/officeDocument/2006/relationships" xmlns:p="http://schemas.openxmlformats.org/presentationml/2006/main">
+  <p:cSld>
+    <p:spTree>
+      <p:nvGrpSpPr>
+        <p:cNvPr id="1" name=""/>
+        <p:cNvGrpSpPr/>
+        <p:nvPr/>
+      </p:nvGrpSpPr>
+      <p:grpSpPr>
+        <a:xfrm>
+          <a:off x="0" y="0"/>
+          <a:ext cx="0" cy="0"/>
+          <a:chOff x="0" y="0"/>
+          <a:chExt cx="0" cy="0"/>
+        </a:xfrm>
+      </p:grpSpPr>
+      <p:sp>
+        <p:nvSpPr>
+          <p:cNvPr id="2" name="Title 1"/>
+          <p:cNvSpPr>
+            <a:spLocks noGrp="1"/>
+          </p:cNvSpPr>
+          <p:nvPr>
+            <p:ph type="title"/>
+          </p:nvPr>
+        </p:nvSpPr>
+        <p:spPr>
+          <a:xfrm>
+            <a:off x="2347515" y="2668801"/>
+            <a:ext cx="7729728" cy="1188720"/>
+          </a:xfrm>
+        </p:spPr>
+        <p:txBody>
+          <a:bodyPr/>
+          <a:lstStyle/>
+          <a:p>
+            <a:r>
+              <a:rPr lang="en-US" dirty="0" smtClean="0"/>
+              <a:t>Demo</a:t>
+            </a:r>
+            <a:endParaRPr lang="en-US" dirty="0"/>
+          </a:p>
+        </p:txBody>
+      </p:sp>
+    </p:spTree>
+    <p:extLst>
+      <p:ext uri="{BB962C8B-B14F-4D97-AF65-F5344CB8AC3E}">
+        <p14:creationId xmlns:p14="http://schemas.microsoft.com/office/powerpoint/2010/main" val="2557638148"/>
+      </p:ext>
+    </p:extLst>
+  </p:cSld>
+  <p:clrMapOvr>
+    <a:masterClrMapping/>
+  </p:clrMapOvr>
+</p:sld>
+</file>
+
+<file path=ppt/slides/slide8.xml><?xml version="1.0" encoding="utf-8"?>
+<p:sld xmlns:a="http://schemas.openxmlformats.org/drawingml/2006/main" xmlns:r="http://schemas.openxmlformats.org/officeDocument/2006/relationships" xmlns:p="http://schemas.openxmlformats.org/presentationml/2006/main">
+  <p:cSld>
+    <p:spTree>
+      <p:nvGrpSpPr>
+        <p:cNvPr id="1" name=""/>
+        <p:cNvGrpSpPr/>
+        <p:nvPr/>
+      </p:nvGrpSpPr>
+      <p:grpSpPr>
+        <a:xfrm>
+          <a:off x="0" y="0"/>
+          <a:ext cx="0" cy="0"/>
+          <a:chOff x="0" y="0"/>
+          <a:chExt cx="0" cy="0"/>
+        </a:xfrm>
+      </p:grpSpPr>
       <p:sp>
         <p:nvSpPr>
           <p:cNvPr id="2" name="Title 1"/>
@@ -4071,13 +4308,13 @@
         </p:nvSpPr>
         <p:spPr>
           <a:xfrm>
-            <a:off x="1620982" y="2302626"/>
+            <a:off x="1620982" y="2078175"/>
             <a:ext cx="8339882" cy="4039986"/>
           </a:xfrm>
         </p:spPr>
         <p:txBody>
           <a:bodyPr>
-            <a:normAutofit lnSpcReduction="10000"/>
+            <a:normAutofit/>
           </a:bodyPr>
           <a:lstStyle/>
           <a:p>
@@ -4101,12 +4338,9 @@
             <a:pPr lvl="1"/>
             <a:r>
               <a:rPr lang="en-US" dirty="0" err="1" smtClean="0"/>
-              <a:t>sb</a:t>
-            </a:r>
-            <a:r>
-              <a:rPr lang="en-US" dirty="0" smtClean="0"/>
-              <a:t> helped us load values</a:t>
-            </a:r>
+              <a:t>pseudoinstructions</a:t>
+            </a:r>
+            <a:endParaRPr lang="en-US" dirty="0" smtClean="0"/>
           </a:p>
           <a:p>
             <a:pPr lvl="1"/>
@@ -4129,11 +4363,12 @@
             <a:pPr lvl="1"/>
             <a:r>
               <a:rPr lang="en-US" dirty="0" smtClean="0"/>
-              <a:t>Memory access</a:t>
-            </a:r>
-          </a:p>
-          <a:p>
-            <a:pPr lvl="1"/>
+              <a:t>Memory </a:t>
+            </a:r>
+            <a:r>
+              <a:rPr lang="en-US" dirty="0" smtClean="0"/>
+              <a:t>access</a:t>
+            </a:r>
             <a:endParaRPr lang="en-US" dirty="0" smtClean="0"/>
           </a:p>
           <a:p>

</xml_diff>